<commit_message>
Do corner homography stuff.
</commit_message>
<xml_diff>
--- a/markers/compile_markers.pptx
+++ b/markers/compile_markers.pptx
@@ -104,6 +104,11 @@
       </a:defRPr>
     </a:lvl9pPr>
   </p:defaultTextStyle>
+  <p:extLst>
+    <p:ext uri="{EFAFB233-063F-42B5-8137-9DF3F51BA10A}">
+      <p15:sldGuideLst xmlns:p15="http://schemas.microsoft.com/office/powerpoint/2012/main"/>
+    </p:ext>
+  </p:extLst>
 </p:presentation>
 </file>
 
@@ -238,7 +243,7 @@
           <a:p>
             <a:fld id="{AFFB2A11-CD00-A447-BADF-B8ED25204096}" type="datetimeFigureOut">
               <a:rPr lang="en-US" smtClean="0"/>
-              <a:t>12/20/23</a:t>
+              <a:t>1/2/24</a:t>
             </a:fld>
             <a:endParaRPr lang="en-US"/>
           </a:p>
@@ -408,7 +413,7 @@
           <a:p>
             <a:fld id="{AFFB2A11-CD00-A447-BADF-B8ED25204096}" type="datetimeFigureOut">
               <a:rPr lang="en-US" smtClean="0"/>
-              <a:t>12/20/23</a:t>
+              <a:t>1/2/24</a:t>
             </a:fld>
             <a:endParaRPr lang="en-US"/>
           </a:p>
@@ -588,7 +593,7 @@
           <a:p>
             <a:fld id="{AFFB2A11-CD00-A447-BADF-B8ED25204096}" type="datetimeFigureOut">
               <a:rPr lang="en-US" smtClean="0"/>
-              <a:t>12/20/23</a:t>
+              <a:t>1/2/24</a:t>
             </a:fld>
             <a:endParaRPr lang="en-US"/>
           </a:p>
@@ -758,7 +763,7 @@
           <a:p>
             <a:fld id="{AFFB2A11-CD00-A447-BADF-B8ED25204096}" type="datetimeFigureOut">
               <a:rPr lang="en-US" smtClean="0"/>
-              <a:t>12/20/23</a:t>
+              <a:t>1/2/24</a:t>
             </a:fld>
             <a:endParaRPr lang="en-US"/>
           </a:p>
@@ -1004,7 +1009,7 @@
           <a:p>
             <a:fld id="{AFFB2A11-CD00-A447-BADF-B8ED25204096}" type="datetimeFigureOut">
               <a:rPr lang="en-US" smtClean="0"/>
-              <a:t>12/20/23</a:t>
+              <a:t>1/2/24</a:t>
             </a:fld>
             <a:endParaRPr lang="en-US"/>
           </a:p>
@@ -1236,7 +1241,7 @@
           <a:p>
             <a:fld id="{AFFB2A11-CD00-A447-BADF-B8ED25204096}" type="datetimeFigureOut">
               <a:rPr lang="en-US" smtClean="0"/>
-              <a:t>12/20/23</a:t>
+              <a:t>1/2/24</a:t>
             </a:fld>
             <a:endParaRPr lang="en-US"/>
           </a:p>
@@ -1603,7 +1608,7 @@
           <a:p>
             <a:fld id="{AFFB2A11-CD00-A447-BADF-B8ED25204096}" type="datetimeFigureOut">
               <a:rPr lang="en-US" smtClean="0"/>
-              <a:t>12/20/23</a:t>
+              <a:t>1/2/24</a:t>
             </a:fld>
             <a:endParaRPr lang="en-US"/>
           </a:p>
@@ -1721,7 +1726,7 @@
           <a:p>
             <a:fld id="{AFFB2A11-CD00-A447-BADF-B8ED25204096}" type="datetimeFigureOut">
               <a:rPr lang="en-US" smtClean="0"/>
-              <a:t>12/20/23</a:t>
+              <a:t>1/2/24</a:t>
             </a:fld>
             <a:endParaRPr lang="en-US"/>
           </a:p>
@@ -1816,7 +1821,7 @@
           <a:p>
             <a:fld id="{AFFB2A11-CD00-A447-BADF-B8ED25204096}" type="datetimeFigureOut">
               <a:rPr lang="en-US" smtClean="0"/>
-              <a:t>12/20/23</a:t>
+              <a:t>1/2/24</a:t>
             </a:fld>
             <a:endParaRPr lang="en-US"/>
           </a:p>
@@ -2093,7 +2098,7 @@
           <a:p>
             <a:fld id="{AFFB2A11-CD00-A447-BADF-B8ED25204096}" type="datetimeFigureOut">
               <a:rPr lang="en-US" smtClean="0"/>
-              <a:t>12/20/23</a:t>
+              <a:t>1/2/24</a:t>
             </a:fld>
             <a:endParaRPr lang="en-US"/>
           </a:p>
@@ -2350,7 +2355,7 @@
           <a:p>
             <a:fld id="{AFFB2A11-CD00-A447-BADF-B8ED25204096}" type="datetimeFigureOut">
               <a:rPr lang="en-US" smtClean="0"/>
-              <a:t>12/20/23</a:t>
+              <a:t>1/2/24</a:t>
             </a:fld>
             <a:endParaRPr lang="en-US"/>
           </a:p>
@@ -2563,7 +2568,7 @@
           <a:p>
             <a:fld id="{AFFB2A11-CD00-A447-BADF-B8ED25204096}" type="datetimeFigureOut">
               <a:rPr lang="en-US" smtClean="0"/>
-              <a:t>12/20/23</a:t>
+              <a:t>1/2/24</a:t>
             </a:fld>
             <a:endParaRPr lang="en-US"/>
           </a:p>
@@ -2970,10 +2975,10 @@
       </p:grpSpPr>
       <p:pic>
         <p:nvPicPr>
-          <p:cNvPr id="15" name="Picture 14" descr="A black and white pixelated background&#10;&#10;Description automatically generated">
+          <p:cNvPr id="19" name="Picture 18" descr="A black and white logo&#10;&#10;Description automatically generated">
             <a:extLst>
               <a:ext uri="{FF2B5EF4-FFF2-40B4-BE49-F238E27FC236}">
-                <a16:creationId xmlns:a16="http://schemas.microsoft.com/office/drawing/2014/main" id="{26B88CAD-D976-31A0-AE98-F9B6D21013AB}"/>
+                <a16:creationId xmlns:a16="http://schemas.microsoft.com/office/drawing/2014/main" id="{C35680F9-8E47-9971-5FD8-3A284720590E}"/>
               </a:ext>
             </a:extLst>
           </p:cNvPr>
@@ -2990,7 +2995,7 @@
         </p:blipFill>
         <p:spPr>
           <a:xfrm>
-            <a:off x="5486402" y="698500"/>
+            <a:off x="698498" y="698500"/>
             <a:ext cx="1587500" cy="1587500"/>
           </a:xfrm>
           <a:prstGeom prst="rect">
@@ -3000,10 +3005,10 @@
       </p:pic>
       <p:pic>
         <p:nvPicPr>
-          <p:cNvPr id="17" name="Picture 16" descr="A white and black logo&#10;&#10;Description automatically generated">
+          <p:cNvPr id="2" name="Picture 1" descr="A black and white pixelated background&#10;&#10;Description automatically generated">
             <a:extLst>
               <a:ext uri="{FF2B5EF4-FFF2-40B4-BE49-F238E27FC236}">
-                <a16:creationId xmlns:a16="http://schemas.microsoft.com/office/drawing/2014/main" id="{548B1C3F-2AEF-9960-9621-61FB3AFA4BF3}"/>
+                <a16:creationId xmlns:a16="http://schemas.microsoft.com/office/drawing/2014/main" id="{BAA5FB92-4A56-4265-E051-CACACFDA4041}"/>
               </a:ext>
             </a:extLst>
           </p:cNvPr>
@@ -3020,7 +3025,7 @@
         </p:blipFill>
         <p:spPr>
           <a:xfrm>
-            <a:off x="698500" y="7772400"/>
+            <a:off x="5486400" y="7840132"/>
             <a:ext cx="1587500" cy="1587500"/>
           </a:xfrm>
           <a:prstGeom prst="rect">
@@ -3030,10 +3035,10 @@
       </p:pic>
       <p:pic>
         <p:nvPicPr>
-          <p:cNvPr id="19" name="Picture 18" descr="A black and white logo&#10;&#10;Description automatically generated">
+          <p:cNvPr id="3" name="Picture 2" descr="A black and white pixelated logo&#10;&#10;Description automatically generated">
             <a:extLst>
               <a:ext uri="{FF2B5EF4-FFF2-40B4-BE49-F238E27FC236}">
-                <a16:creationId xmlns:a16="http://schemas.microsoft.com/office/drawing/2014/main" id="{C35680F9-8E47-9971-5FD8-3A284720590E}"/>
+                <a16:creationId xmlns:a16="http://schemas.microsoft.com/office/drawing/2014/main" id="{BD40CFEE-7A87-D0C8-1098-3B339E77BFCC}"/>
               </a:ext>
             </a:extLst>
           </p:cNvPr>
@@ -3050,7 +3055,7 @@
         </p:blipFill>
         <p:spPr>
           <a:xfrm>
-            <a:off x="5486402" y="7772400"/>
+            <a:off x="698498" y="7840132"/>
             <a:ext cx="1587500" cy="1587500"/>
           </a:xfrm>
           <a:prstGeom prst="rect">
@@ -3060,10 +3065,10 @@
       </p:pic>
       <p:pic>
         <p:nvPicPr>
-          <p:cNvPr id="13" name="Picture 12" descr="A black and white pixelated logo&#10;&#10;Description automatically generated">
+          <p:cNvPr id="4" name="Picture 3" descr="A white and black logo&#10;&#10;Description automatically generated">
             <a:extLst>
               <a:ext uri="{FF2B5EF4-FFF2-40B4-BE49-F238E27FC236}">
-                <a16:creationId xmlns:a16="http://schemas.microsoft.com/office/drawing/2014/main" id="{E7282D48-2F81-046D-8289-C95716833A9D}"/>
+                <a16:creationId xmlns:a16="http://schemas.microsoft.com/office/drawing/2014/main" id="{44FEE116-42C7-A9AA-16AB-821D34557D85}"/>
               </a:ext>
             </a:extLst>
           </p:cNvPr>
@@ -3080,7 +3085,7 @@
         </p:blipFill>
         <p:spPr>
           <a:xfrm>
-            <a:off x="698500" y="698500"/>
+            <a:off x="5486400" y="698500"/>
             <a:ext cx="1587500" cy="1587500"/>
           </a:xfrm>
           <a:prstGeom prst="rect">
@@ -3088,6 +3093,150 @@
           </a:prstGeom>
         </p:spPr>
       </p:pic>
+      <p:sp>
+        <p:nvSpPr>
+          <p:cNvPr id="5" name="TextBox 4">
+            <a:extLst>
+              <a:ext uri="{FF2B5EF4-FFF2-40B4-BE49-F238E27FC236}">
+                <a16:creationId xmlns:a16="http://schemas.microsoft.com/office/drawing/2014/main" id="{7D33E40D-EA3B-276A-C2AA-F3A2B96D95F8}"/>
+              </a:ext>
+            </a:extLst>
+          </p:cNvPr>
+          <p:cNvSpPr txBox="1"/>
+          <p:nvPr/>
+        </p:nvSpPr>
+        <p:spPr>
+          <a:xfrm>
+            <a:off x="1338199" y="2286000"/>
+            <a:ext cx="308098" cy="369332"/>
+          </a:xfrm>
+          <a:prstGeom prst="rect">
+            <a:avLst/>
+          </a:prstGeom>
+          <a:noFill/>
+        </p:spPr>
+        <p:txBody>
+          <a:bodyPr wrap="none" rtlCol="0">
+            <a:spAutoFit/>
+          </a:bodyPr>
+          <a:lstStyle/>
+          <a:p>
+            <a:pPr algn="ctr"/>
+            <a:r>
+              <a:rPr lang="en-US" dirty="0"/>
+              <a:t>3</a:t>
+            </a:r>
+          </a:p>
+        </p:txBody>
+      </p:sp>
+      <p:sp>
+        <p:nvSpPr>
+          <p:cNvPr id="6" name="TextBox 5">
+            <a:extLst>
+              <a:ext uri="{FF2B5EF4-FFF2-40B4-BE49-F238E27FC236}">
+                <a16:creationId xmlns:a16="http://schemas.microsoft.com/office/drawing/2014/main" id="{1CBD2C47-1E7F-5C19-15D4-6382A47C8687}"/>
+              </a:ext>
+            </a:extLst>
+          </p:cNvPr>
+          <p:cNvSpPr txBox="1"/>
+          <p:nvPr/>
+        </p:nvSpPr>
+        <p:spPr>
+          <a:xfrm>
+            <a:off x="6126101" y="2286000"/>
+            <a:ext cx="308098" cy="369332"/>
+          </a:xfrm>
+          <a:prstGeom prst="rect">
+            <a:avLst/>
+          </a:prstGeom>
+          <a:noFill/>
+        </p:spPr>
+        <p:txBody>
+          <a:bodyPr wrap="none" rtlCol="0">
+            <a:spAutoFit/>
+          </a:bodyPr>
+          <a:lstStyle/>
+          <a:p>
+            <a:pPr algn="ctr"/>
+            <a:r>
+              <a:rPr lang="en-US" dirty="0"/>
+              <a:t>2</a:t>
+            </a:r>
+          </a:p>
+        </p:txBody>
+      </p:sp>
+      <p:sp>
+        <p:nvSpPr>
+          <p:cNvPr id="7" name="TextBox 6">
+            <a:extLst>
+              <a:ext uri="{FF2B5EF4-FFF2-40B4-BE49-F238E27FC236}">
+                <a16:creationId xmlns:a16="http://schemas.microsoft.com/office/drawing/2014/main" id="{F9FF8D4F-5D9B-2414-4515-96B110B48A91}"/>
+              </a:ext>
+            </a:extLst>
+          </p:cNvPr>
+          <p:cNvSpPr txBox="1"/>
+          <p:nvPr/>
+        </p:nvSpPr>
+        <p:spPr>
+          <a:xfrm>
+            <a:off x="6126101" y="9427632"/>
+            <a:ext cx="308098" cy="369332"/>
+          </a:xfrm>
+          <a:prstGeom prst="rect">
+            <a:avLst/>
+          </a:prstGeom>
+          <a:noFill/>
+        </p:spPr>
+        <p:txBody>
+          <a:bodyPr wrap="none" rtlCol="0">
+            <a:spAutoFit/>
+          </a:bodyPr>
+          <a:lstStyle/>
+          <a:p>
+            <a:pPr algn="ctr"/>
+            <a:r>
+              <a:rPr lang="en-US" dirty="0"/>
+              <a:t>1</a:t>
+            </a:r>
+          </a:p>
+        </p:txBody>
+      </p:sp>
+      <p:sp>
+        <p:nvSpPr>
+          <p:cNvPr id="8" name="TextBox 7">
+            <a:extLst>
+              <a:ext uri="{FF2B5EF4-FFF2-40B4-BE49-F238E27FC236}">
+                <a16:creationId xmlns:a16="http://schemas.microsoft.com/office/drawing/2014/main" id="{BDDF0F76-83F5-BA23-E213-BB706AAF0AD8}"/>
+              </a:ext>
+            </a:extLst>
+          </p:cNvPr>
+          <p:cNvSpPr txBox="1"/>
+          <p:nvPr/>
+        </p:nvSpPr>
+        <p:spPr>
+          <a:xfrm>
+            <a:off x="1338199" y="9427632"/>
+            <a:ext cx="308098" cy="369332"/>
+          </a:xfrm>
+          <a:prstGeom prst="rect">
+            <a:avLst/>
+          </a:prstGeom>
+          <a:noFill/>
+        </p:spPr>
+        <p:txBody>
+          <a:bodyPr wrap="none" rtlCol="0">
+            <a:spAutoFit/>
+          </a:bodyPr>
+          <a:lstStyle/>
+          <a:p>
+            <a:pPr algn="ctr"/>
+            <a:r>
+              <a:rPr lang="en-US" dirty="0"/>
+              <a:t>0</a:t>
+            </a:r>
+          </a:p>
+        </p:txBody>
+      </p:sp>
     </p:spTree>
     <p:extLst>
       <p:ext uri="{BB962C8B-B14F-4D97-AF65-F5344CB8AC3E}">

</xml_diff>

<commit_message>
Do some sort of perspective warping on a test image.
</commit_message>
<xml_diff>
--- a/markers/compile_markers.pptx
+++ b/markers/compile_markers.pptx
@@ -6,6 +6,7 @@
   </p:sldMasterIdLst>
   <p:sldIdLst>
     <p:sldId id="256" r:id="rId2"/>
+    <p:sldId id="257" r:id="rId3"/>
   </p:sldIdLst>
   <p:sldSz cx="7772400" cy="10058400"/>
   <p:notesSz cx="6858000" cy="9144000"/>
@@ -3250,6 +3251,516 @@
 </p:sld>
 </file>
 
+<file path=ppt/slides/slide2.xml><?xml version="1.0" encoding="utf-8"?>
+<p:sld xmlns:a="http://schemas.openxmlformats.org/drawingml/2006/main" xmlns:r="http://schemas.openxmlformats.org/officeDocument/2006/relationships" xmlns:p="http://schemas.openxmlformats.org/presentationml/2006/main">
+  <p:cSld>
+    <p:spTree>
+      <p:nvGrpSpPr>
+        <p:cNvPr id="1" name=""/>
+        <p:cNvGrpSpPr/>
+        <p:nvPr/>
+      </p:nvGrpSpPr>
+      <p:grpSpPr>
+        <a:xfrm>
+          <a:off x="0" y="0"/>
+          <a:ext cx="0" cy="0"/>
+          <a:chOff x="0" y="0"/>
+          <a:chExt cx="0" cy="0"/>
+        </a:xfrm>
+      </p:grpSpPr>
+      <p:sp>
+        <p:nvSpPr>
+          <p:cNvPr id="14" name="Rectangle 13">
+            <a:extLst>
+              <a:ext uri="{FF2B5EF4-FFF2-40B4-BE49-F238E27FC236}">
+                <a16:creationId xmlns:a16="http://schemas.microsoft.com/office/drawing/2014/main" id="{CF24D51F-F536-F73B-26E5-921CB27F6740}"/>
+              </a:ext>
+            </a:extLst>
+          </p:cNvPr>
+          <p:cNvSpPr/>
+          <p:nvPr/>
+        </p:nvSpPr>
+        <p:spPr>
+          <a:xfrm>
+            <a:off x="2618284" y="878597"/>
+            <a:ext cx="2249236" cy="2392196"/>
+          </a:xfrm>
+          <a:prstGeom prst="rect">
+            <a:avLst/>
+          </a:prstGeom>
+          <a:solidFill>
+            <a:schemeClr val="bg1"/>
+          </a:solidFill>
+          <a:ln>
+            <a:solidFill>
+              <a:schemeClr val="tx1"/>
+            </a:solidFill>
+          </a:ln>
+        </p:spPr>
+        <p:style>
+          <a:lnRef idx="2">
+            <a:schemeClr val="accent1">
+              <a:shade val="15000"/>
+            </a:schemeClr>
+          </a:lnRef>
+          <a:fillRef idx="1">
+            <a:schemeClr val="accent1"/>
+          </a:fillRef>
+          <a:effectRef idx="0">
+            <a:schemeClr val="accent1"/>
+          </a:effectRef>
+          <a:fontRef idx="minor">
+            <a:schemeClr val="lt1"/>
+          </a:fontRef>
+        </p:style>
+        <p:txBody>
+          <a:bodyPr rtlCol="0" anchor="ctr"/>
+          <a:lstStyle/>
+          <a:p>
+            <a:pPr algn="ctr"/>
+            <a:endParaRPr lang="en-US"/>
+          </a:p>
+        </p:txBody>
+      </p:sp>
+      <p:sp>
+        <p:nvSpPr>
+          <p:cNvPr id="12" name="Rectangle 11">
+            <a:extLst>
+              <a:ext uri="{FF2B5EF4-FFF2-40B4-BE49-F238E27FC236}">
+                <a16:creationId xmlns:a16="http://schemas.microsoft.com/office/drawing/2014/main" id="{0E10ADCB-01E7-DB64-1909-B766E8FD92AB}"/>
+              </a:ext>
+            </a:extLst>
+          </p:cNvPr>
+          <p:cNvSpPr/>
+          <p:nvPr/>
+        </p:nvSpPr>
+        <p:spPr>
+          <a:xfrm>
+            <a:off x="369247" y="878597"/>
+            <a:ext cx="2249236" cy="2392196"/>
+          </a:xfrm>
+          <a:prstGeom prst="rect">
+            <a:avLst/>
+          </a:prstGeom>
+          <a:solidFill>
+            <a:schemeClr val="bg1"/>
+          </a:solidFill>
+          <a:ln>
+            <a:solidFill>
+              <a:schemeClr val="tx1"/>
+            </a:solidFill>
+          </a:ln>
+        </p:spPr>
+        <p:style>
+          <a:lnRef idx="2">
+            <a:schemeClr val="accent1">
+              <a:shade val="15000"/>
+            </a:schemeClr>
+          </a:lnRef>
+          <a:fillRef idx="1">
+            <a:schemeClr val="accent1"/>
+          </a:fillRef>
+          <a:effectRef idx="0">
+            <a:schemeClr val="accent1"/>
+          </a:effectRef>
+          <a:fontRef idx="minor">
+            <a:schemeClr val="lt1"/>
+          </a:fontRef>
+        </p:style>
+        <p:txBody>
+          <a:bodyPr rtlCol="0" anchor="ctr"/>
+          <a:lstStyle/>
+          <a:p>
+            <a:pPr algn="ctr"/>
+            <a:endParaRPr lang="en-US"/>
+          </a:p>
+        </p:txBody>
+      </p:sp>
+      <p:sp>
+        <p:nvSpPr>
+          <p:cNvPr id="10" name="Rectangle 9">
+            <a:extLst>
+              <a:ext uri="{FF2B5EF4-FFF2-40B4-BE49-F238E27FC236}">
+                <a16:creationId xmlns:a16="http://schemas.microsoft.com/office/drawing/2014/main" id="{950992F0-6E9E-B606-1386-8FD5246AF030}"/>
+              </a:ext>
+            </a:extLst>
+          </p:cNvPr>
+          <p:cNvSpPr/>
+          <p:nvPr/>
+        </p:nvSpPr>
+        <p:spPr>
+          <a:xfrm>
+            <a:off x="369446" y="3270793"/>
+            <a:ext cx="2249236" cy="2392196"/>
+          </a:xfrm>
+          <a:prstGeom prst="rect">
+            <a:avLst/>
+          </a:prstGeom>
+          <a:solidFill>
+            <a:schemeClr val="bg1"/>
+          </a:solidFill>
+          <a:ln>
+            <a:solidFill>
+              <a:schemeClr val="tx1"/>
+            </a:solidFill>
+          </a:ln>
+        </p:spPr>
+        <p:style>
+          <a:lnRef idx="2">
+            <a:schemeClr val="accent1">
+              <a:shade val="15000"/>
+            </a:schemeClr>
+          </a:lnRef>
+          <a:fillRef idx="1">
+            <a:schemeClr val="accent1"/>
+          </a:fillRef>
+          <a:effectRef idx="0">
+            <a:schemeClr val="accent1"/>
+          </a:effectRef>
+          <a:fontRef idx="minor">
+            <a:schemeClr val="lt1"/>
+          </a:fontRef>
+        </p:style>
+        <p:txBody>
+          <a:bodyPr rtlCol="0" anchor="ctr"/>
+          <a:lstStyle/>
+          <a:p>
+            <a:pPr algn="ctr"/>
+            <a:endParaRPr lang="en-US"/>
+          </a:p>
+        </p:txBody>
+      </p:sp>
+      <p:sp>
+        <p:nvSpPr>
+          <p:cNvPr id="11" name="Rectangle 10">
+            <a:extLst>
+              <a:ext uri="{FF2B5EF4-FFF2-40B4-BE49-F238E27FC236}">
+                <a16:creationId xmlns:a16="http://schemas.microsoft.com/office/drawing/2014/main" id="{88B95F86-F642-8043-D155-4159B98AEF5A}"/>
+              </a:ext>
+            </a:extLst>
+          </p:cNvPr>
+          <p:cNvSpPr/>
+          <p:nvPr/>
+        </p:nvSpPr>
+        <p:spPr>
+          <a:xfrm>
+            <a:off x="2618284" y="3270793"/>
+            <a:ext cx="2249236" cy="2392196"/>
+          </a:xfrm>
+          <a:prstGeom prst="rect">
+            <a:avLst/>
+          </a:prstGeom>
+          <a:solidFill>
+            <a:schemeClr val="bg1"/>
+          </a:solidFill>
+          <a:ln>
+            <a:solidFill>
+              <a:schemeClr val="tx1"/>
+            </a:solidFill>
+          </a:ln>
+        </p:spPr>
+        <p:style>
+          <a:lnRef idx="2">
+            <a:schemeClr val="accent1">
+              <a:shade val="15000"/>
+            </a:schemeClr>
+          </a:lnRef>
+          <a:fillRef idx="1">
+            <a:schemeClr val="accent1"/>
+          </a:fillRef>
+          <a:effectRef idx="0">
+            <a:schemeClr val="accent1"/>
+          </a:effectRef>
+          <a:fontRef idx="minor">
+            <a:schemeClr val="lt1"/>
+          </a:fontRef>
+        </p:style>
+        <p:txBody>
+          <a:bodyPr rtlCol="0" anchor="ctr"/>
+          <a:lstStyle/>
+          <a:p>
+            <a:pPr algn="ctr"/>
+            <a:endParaRPr lang="en-US"/>
+          </a:p>
+        </p:txBody>
+      </p:sp>
+      <p:pic>
+        <p:nvPicPr>
+          <p:cNvPr id="19" name="Picture 18" descr="A black and white logo&#10;&#10;Description automatically generated">
+            <a:extLst>
+              <a:ext uri="{FF2B5EF4-FFF2-40B4-BE49-F238E27FC236}">
+                <a16:creationId xmlns:a16="http://schemas.microsoft.com/office/drawing/2014/main" id="{C35680F9-8E47-9971-5FD8-3A284720590E}"/>
+              </a:ext>
+            </a:extLst>
+          </p:cNvPr>
+          <p:cNvPicPr>
+            <a:picLocks noChangeAspect="1"/>
+          </p:cNvPicPr>
+          <p:nvPr/>
+        </p:nvPicPr>
+        <p:blipFill>
+          <a:blip r:embed="rId2"/>
+          <a:stretch>
+            <a:fillRect/>
+          </a:stretch>
+        </p:blipFill>
+        <p:spPr>
+          <a:xfrm>
+            <a:off x="2949152" y="1211392"/>
+            <a:ext cx="1587500" cy="1587500"/>
+          </a:xfrm>
+          <a:prstGeom prst="rect">
+            <a:avLst/>
+          </a:prstGeom>
+        </p:spPr>
+      </p:pic>
+      <p:pic>
+        <p:nvPicPr>
+          <p:cNvPr id="2" name="Picture 1" descr="A black and white pixelated background&#10;&#10;Description automatically generated">
+            <a:extLst>
+              <a:ext uri="{FF2B5EF4-FFF2-40B4-BE49-F238E27FC236}">
+                <a16:creationId xmlns:a16="http://schemas.microsoft.com/office/drawing/2014/main" id="{BAA5FB92-4A56-4265-E051-CACACFDA4041}"/>
+              </a:ext>
+            </a:extLst>
+          </p:cNvPr>
+          <p:cNvPicPr>
+            <a:picLocks noChangeAspect="1"/>
+          </p:cNvPicPr>
+          <p:nvPr/>
+        </p:nvPicPr>
+        <p:blipFill>
+          <a:blip r:embed="rId3"/>
+          <a:stretch>
+            <a:fillRect/>
+          </a:stretch>
+        </p:blipFill>
+        <p:spPr>
+          <a:xfrm>
+            <a:off x="2949351" y="3786327"/>
+            <a:ext cx="1587500" cy="1587500"/>
+          </a:xfrm>
+          <a:prstGeom prst="rect">
+            <a:avLst/>
+          </a:prstGeom>
+        </p:spPr>
+      </p:pic>
+      <p:pic>
+        <p:nvPicPr>
+          <p:cNvPr id="3" name="Picture 2" descr="A black and white pixelated logo&#10;&#10;Description automatically generated">
+            <a:extLst>
+              <a:ext uri="{FF2B5EF4-FFF2-40B4-BE49-F238E27FC236}">
+                <a16:creationId xmlns:a16="http://schemas.microsoft.com/office/drawing/2014/main" id="{BD40CFEE-7A87-D0C8-1098-3B339E77BFCC}"/>
+              </a:ext>
+            </a:extLst>
+          </p:cNvPr>
+          <p:cNvPicPr>
+            <a:picLocks noChangeAspect="1"/>
+          </p:cNvPicPr>
+          <p:nvPr/>
+        </p:nvPicPr>
+        <p:blipFill>
+          <a:blip r:embed="rId4"/>
+          <a:stretch>
+            <a:fillRect/>
+          </a:stretch>
+        </p:blipFill>
+        <p:spPr>
+          <a:xfrm>
+            <a:off x="700115" y="3786327"/>
+            <a:ext cx="1587500" cy="1587500"/>
+          </a:xfrm>
+          <a:prstGeom prst="rect">
+            <a:avLst/>
+          </a:prstGeom>
+        </p:spPr>
+      </p:pic>
+      <p:pic>
+        <p:nvPicPr>
+          <p:cNvPr id="4" name="Picture 3" descr="A white and black logo&#10;&#10;Description automatically generated">
+            <a:extLst>
+              <a:ext uri="{FF2B5EF4-FFF2-40B4-BE49-F238E27FC236}">
+                <a16:creationId xmlns:a16="http://schemas.microsoft.com/office/drawing/2014/main" id="{44FEE116-42C7-A9AA-16AB-821D34557D85}"/>
+              </a:ext>
+            </a:extLst>
+          </p:cNvPr>
+          <p:cNvPicPr>
+            <a:picLocks noChangeAspect="1"/>
+          </p:cNvPicPr>
+          <p:nvPr/>
+        </p:nvPicPr>
+        <p:blipFill>
+          <a:blip r:embed="rId5"/>
+          <a:stretch>
+            <a:fillRect/>
+          </a:stretch>
+        </p:blipFill>
+        <p:spPr>
+          <a:xfrm>
+            <a:off x="700115" y="1211392"/>
+            <a:ext cx="1587500" cy="1587500"/>
+          </a:xfrm>
+          <a:prstGeom prst="rect">
+            <a:avLst/>
+          </a:prstGeom>
+        </p:spPr>
+      </p:pic>
+      <p:sp>
+        <p:nvSpPr>
+          <p:cNvPr id="5" name="TextBox 4">
+            <a:extLst>
+              <a:ext uri="{FF2B5EF4-FFF2-40B4-BE49-F238E27FC236}">
+                <a16:creationId xmlns:a16="http://schemas.microsoft.com/office/drawing/2014/main" id="{7D33E40D-EA3B-276A-C2AA-F3A2B96D95F8}"/>
+              </a:ext>
+            </a:extLst>
+          </p:cNvPr>
+          <p:cNvSpPr txBox="1"/>
+          <p:nvPr/>
+        </p:nvSpPr>
+        <p:spPr>
+          <a:xfrm>
+            <a:off x="3588853" y="2798892"/>
+            <a:ext cx="308098" cy="369332"/>
+          </a:xfrm>
+          <a:prstGeom prst="rect">
+            <a:avLst/>
+          </a:prstGeom>
+          <a:noFill/>
+        </p:spPr>
+        <p:txBody>
+          <a:bodyPr wrap="none" rtlCol="0">
+            <a:spAutoFit/>
+          </a:bodyPr>
+          <a:lstStyle/>
+          <a:p>
+            <a:pPr algn="ctr"/>
+            <a:r>
+              <a:rPr lang="en-US" dirty="0"/>
+              <a:t>3</a:t>
+            </a:r>
+          </a:p>
+        </p:txBody>
+      </p:sp>
+      <p:sp>
+        <p:nvSpPr>
+          <p:cNvPr id="6" name="TextBox 5">
+            <a:extLst>
+              <a:ext uri="{FF2B5EF4-FFF2-40B4-BE49-F238E27FC236}">
+                <a16:creationId xmlns:a16="http://schemas.microsoft.com/office/drawing/2014/main" id="{1CBD2C47-1E7F-5C19-15D4-6382A47C8687}"/>
+              </a:ext>
+            </a:extLst>
+          </p:cNvPr>
+          <p:cNvSpPr txBox="1"/>
+          <p:nvPr/>
+        </p:nvSpPr>
+        <p:spPr>
+          <a:xfrm>
+            <a:off x="1339816" y="2798892"/>
+            <a:ext cx="308098" cy="369332"/>
+          </a:xfrm>
+          <a:prstGeom prst="rect">
+            <a:avLst/>
+          </a:prstGeom>
+          <a:noFill/>
+        </p:spPr>
+        <p:txBody>
+          <a:bodyPr wrap="none" rtlCol="0">
+            <a:spAutoFit/>
+          </a:bodyPr>
+          <a:lstStyle/>
+          <a:p>
+            <a:pPr algn="ctr"/>
+            <a:r>
+              <a:rPr lang="en-US" dirty="0"/>
+              <a:t>2</a:t>
+            </a:r>
+          </a:p>
+        </p:txBody>
+      </p:sp>
+      <p:sp>
+        <p:nvSpPr>
+          <p:cNvPr id="7" name="TextBox 6">
+            <a:extLst>
+              <a:ext uri="{FF2B5EF4-FFF2-40B4-BE49-F238E27FC236}">
+                <a16:creationId xmlns:a16="http://schemas.microsoft.com/office/drawing/2014/main" id="{F9FF8D4F-5D9B-2414-4515-96B110B48A91}"/>
+              </a:ext>
+            </a:extLst>
+          </p:cNvPr>
+          <p:cNvSpPr txBox="1"/>
+          <p:nvPr/>
+        </p:nvSpPr>
+        <p:spPr>
+          <a:xfrm>
+            <a:off x="3594930" y="3343894"/>
+            <a:ext cx="308098" cy="369332"/>
+          </a:xfrm>
+          <a:prstGeom prst="rect">
+            <a:avLst/>
+          </a:prstGeom>
+          <a:noFill/>
+        </p:spPr>
+        <p:txBody>
+          <a:bodyPr wrap="none" rtlCol="0">
+            <a:spAutoFit/>
+          </a:bodyPr>
+          <a:lstStyle/>
+          <a:p>
+            <a:pPr algn="ctr"/>
+            <a:r>
+              <a:rPr lang="en-US" dirty="0"/>
+              <a:t>1</a:t>
+            </a:r>
+          </a:p>
+        </p:txBody>
+      </p:sp>
+      <p:sp>
+        <p:nvSpPr>
+          <p:cNvPr id="8" name="TextBox 7">
+            <a:extLst>
+              <a:ext uri="{FF2B5EF4-FFF2-40B4-BE49-F238E27FC236}">
+                <a16:creationId xmlns:a16="http://schemas.microsoft.com/office/drawing/2014/main" id="{BDDF0F76-83F5-BA23-E213-BB706AAF0AD8}"/>
+              </a:ext>
+            </a:extLst>
+          </p:cNvPr>
+          <p:cNvSpPr txBox="1"/>
+          <p:nvPr/>
+        </p:nvSpPr>
+        <p:spPr>
+          <a:xfrm>
+            <a:off x="1339816" y="3343894"/>
+            <a:ext cx="308098" cy="369332"/>
+          </a:xfrm>
+          <a:prstGeom prst="rect">
+            <a:avLst/>
+          </a:prstGeom>
+          <a:noFill/>
+        </p:spPr>
+        <p:txBody>
+          <a:bodyPr wrap="none" rtlCol="0">
+            <a:spAutoFit/>
+          </a:bodyPr>
+          <a:lstStyle/>
+          <a:p>
+            <a:pPr algn="ctr"/>
+            <a:r>
+              <a:rPr lang="en-US" dirty="0"/>
+              <a:t>0</a:t>
+            </a:r>
+          </a:p>
+        </p:txBody>
+      </p:sp>
+    </p:spTree>
+    <p:extLst>
+      <p:ext uri="{BB962C8B-B14F-4D97-AF65-F5344CB8AC3E}">
+        <p14:creationId xmlns:p14="http://schemas.microsoft.com/office/powerpoint/2010/main" val="2236973208"/>
+      </p:ext>
+    </p:extLst>
+  </p:cSld>
+  <p:clrMapOvr>
+    <a:masterClrMapping/>
+  </p:clrMapOvr>
+</p:sld>
+</file>
+
 <file path=ppt/theme/theme1.xml><?xml version="1.0" encoding="utf-8"?>
 <a:theme xmlns:a="http://schemas.openxmlformats.org/drawingml/2006/main" name="Office Theme">
   <a:themeElements>

</xml_diff>